<commit_message>
more summer course polish
</commit_message>
<xml_diff>
--- a/slides/00-CourseIntroduction_summer.pptx
+++ b/slides/00-CourseIntroduction_summer.pptx
@@ -225,7 +225,7 @@
           <a:p>
             <a:fld id="{C5B45307-6ED4-B142-BD64-10F739779302}" type="datetimeFigureOut">
               <a:rPr lang="en-US" smtClean="0"/>
-              <a:t>5/15/25</a:t>
+              <a:t>5/19/25</a:t>
             </a:fld>
             <a:endParaRPr lang="en-US"/>
           </a:p>
@@ -728,7 +728,7 @@
           <a:noFill/>
           <a:extLst>
             <a:ext uri="{909E8E84-426E-40dd-AFC4-6F175D3DCCD1}">
-              <a14:hiddenFill xmlns="" xmlns:a14="http://schemas.microsoft.com/office/drawing/2010/main">
+              <a14:hiddenFill xmlns:a14="http://schemas.microsoft.com/office/drawing/2010/main" xmlns="">
                 <a:solidFill>
                   <a:srgbClr val="FFFFFF"/>
                 </a:solidFill>
@@ -787,7 +787,7 @@
             </a:ln>
             <a:extLst>
               <a:ext uri="{91240B29-F687-4f45-9708-019B960494DF}">
-                <a14:hiddenLine xmlns="" xmlns:a14="http://schemas.microsoft.com/office/drawing/2010/main" w="9525">
+                <a14:hiddenLine xmlns:a14="http://schemas.microsoft.com/office/drawing/2010/main" xmlns="" w="9525">
                   <a:solidFill>
                     <a:srgbClr val="000000"/>
                   </a:solidFill>
@@ -877,7 +877,7 @@
             </a:ln>
             <a:extLst>
               <a:ext uri="{91240B29-F687-4f45-9708-019B960494DF}">
-                <a14:hiddenLine xmlns="" xmlns:a14="http://schemas.microsoft.com/office/drawing/2010/main" w="9525">
+                <a14:hiddenLine xmlns:a14="http://schemas.microsoft.com/office/drawing/2010/main" xmlns="" w="9525">
                   <a:solidFill>
                     <a:srgbClr val="000000"/>
                   </a:solidFill>
@@ -967,7 +967,7 @@
             </a:ln>
             <a:extLst>
               <a:ext uri="{91240B29-F687-4f45-9708-019B960494DF}">
-                <a14:hiddenLine xmlns="" xmlns:a14="http://schemas.microsoft.com/office/drawing/2010/main" w="9525">
+                <a14:hiddenLine xmlns:a14="http://schemas.microsoft.com/office/drawing/2010/main" xmlns="" w="9525">
                   <a:solidFill>
                     <a:srgbClr val="000000"/>
                   </a:solidFill>
@@ -1001,7 +1001,7 @@
             </a:ln>
             <a:extLst>
               <a:ext uri="{91240B29-F687-4f45-9708-019B960494DF}">
-                <a14:hiddenLine xmlns="" xmlns:a14="http://schemas.microsoft.com/office/drawing/2010/main" w="9525">
+                <a14:hiddenLine xmlns:a14="http://schemas.microsoft.com/office/drawing/2010/main" xmlns="" w="9525">
                   <a:solidFill>
                     <a:srgbClr val="000000"/>
                   </a:solidFill>
@@ -1091,7 +1091,7 @@
             </a:ln>
             <a:extLst>
               <a:ext uri="{91240B29-F687-4f45-9708-019B960494DF}">
-                <a14:hiddenLine xmlns="" xmlns:a14="http://schemas.microsoft.com/office/drawing/2010/main" w="9525">
+                <a14:hiddenLine xmlns:a14="http://schemas.microsoft.com/office/drawing/2010/main" xmlns="" w="9525">
                   <a:solidFill>
                     <a:srgbClr val="000000"/>
                   </a:solidFill>
@@ -1153,7 +1153,7 @@
             </a:ln>
             <a:extLst>
               <a:ext uri="{91240B29-F687-4f45-9708-019B960494DF}">
-                <a14:hiddenLine xmlns="" xmlns:a14="http://schemas.microsoft.com/office/drawing/2010/main" w="9525">
+                <a14:hiddenLine xmlns:a14="http://schemas.microsoft.com/office/drawing/2010/main" xmlns="" w="9525">
                   <a:solidFill>
                     <a:srgbClr val="000000"/>
                   </a:solidFill>
@@ -1215,7 +1215,7 @@
             </a:ln>
             <a:extLst>
               <a:ext uri="{91240B29-F687-4f45-9708-019B960494DF}">
-                <a14:hiddenLine xmlns="" xmlns:a14="http://schemas.microsoft.com/office/drawing/2010/main" w="9525">
+                <a14:hiddenLine xmlns:a14="http://schemas.microsoft.com/office/drawing/2010/main" xmlns="" w="9525">
                   <a:solidFill>
                     <a:srgbClr val="000000"/>
                   </a:solidFill>
@@ -1305,7 +1305,7 @@
             </a:ln>
             <a:extLst>
               <a:ext uri="{91240B29-F687-4f45-9708-019B960494DF}">
-                <a14:hiddenLine xmlns="" xmlns:a14="http://schemas.microsoft.com/office/drawing/2010/main" w="9525">
+                <a14:hiddenLine xmlns:a14="http://schemas.microsoft.com/office/drawing/2010/main" xmlns="" w="9525">
                   <a:solidFill>
                     <a:srgbClr val="000000"/>
                   </a:solidFill>
@@ -1367,7 +1367,7 @@
             </a:ln>
             <a:extLst>
               <a:ext uri="{91240B29-F687-4f45-9708-019B960494DF}">
-                <a14:hiddenLine xmlns="" xmlns:a14="http://schemas.microsoft.com/office/drawing/2010/main" w="9525">
+                <a14:hiddenLine xmlns:a14="http://schemas.microsoft.com/office/drawing/2010/main" xmlns="" w="9525">
                   <a:solidFill>
                     <a:srgbClr val="000000"/>
                   </a:solidFill>
@@ -1429,7 +1429,7 @@
             </a:ln>
             <a:extLst>
               <a:ext uri="{91240B29-F687-4f45-9708-019B960494DF}">
-                <a14:hiddenLine xmlns="" xmlns:a14="http://schemas.microsoft.com/office/drawing/2010/main" w="9525">
+                <a14:hiddenLine xmlns:a14="http://schemas.microsoft.com/office/drawing/2010/main" xmlns="" w="9525">
                   <a:solidFill>
                     <a:srgbClr val="000000"/>
                   </a:solidFill>
@@ -1519,7 +1519,7 @@
             </a:ln>
             <a:extLst>
               <a:ext uri="{91240B29-F687-4f45-9708-019B960494DF}">
-                <a14:hiddenLine xmlns="" xmlns:a14="http://schemas.microsoft.com/office/drawing/2010/main" w="9525">
+                <a14:hiddenLine xmlns:a14="http://schemas.microsoft.com/office/drawing/2010/main" xmlns="" w="9525">
                   <a:solidFill>
                     <a:srgbClr val="000000"/>
                   </a:solidFill>
@@ -1609,7 +1609,7 @@
             </a:ln>
             <a:extLst>
               <a:ext uri="{91240B29-F687-4f45-9708-019B960494DF}">
-                <a14:hiddenLine xmlns="" xmlns:a14="http://schemas.microsoft.com/office/drawing/2010/main" w="9525">
+                <a14:hiddenLine xmlns:a14="http://schemas.microsoft.com/office/drawing/2010/main" xmlns="" w="9525">
                   <a:solidFill>
                     <a:srgbClr val="000000"/>
                   </a:solidFill>
@@ -1671,7 +1671,7 @@
             </a:ln>
             <a:extLst>
               <a:ext uri="{91240B29-F687-4f45-9708-019B960494DF}">
-                <a14:hiddenLine xmlns="" xmlns:a14="http://schemas.microsoft.com/office/drawing/2010/main" w="9525">
+                <a14:hiddenLine xmlns:a14="http://schemas.microsoft.com/office/drawing/2010/main" xmlns="" w="9525">
                   <a:solidFill>
                     <a:srgbClr val="000000"/>
                   </a:solidFill>
@@ -1781,7 +1781,7 @@
             </a:ln>
             <a:extLst>
               <a:ext uri="{91240B29-F687-4f45-9708-019B960494DF}">
-                <a14:hiddenLine xmlns="" xmlns:a14="http://schemas.microsoft.com/office/drawing/2010/main" w="9525">
+                <a14:hiddenLine xmlns:a14="http://schemas.microsoft.com/office/drawing/2010/main" xmlns="" w="9525">
                   <a:solidFill>
                     <a:srgbClr val="000000"/>
                   </a:solidFill>
@@ -1843,7 +1843,7 @@
             </a:ln>
             <a:extLst>
               <a:ext uri="{91240B29-F687-4f45-9708-019B960494DF}">
-                <a14:hiddenLine xmlns="" xmlns:a14="http://schemas.microsoft.com/office/drawing/2010/main" w="9525">
+                <a14:hiddenLine xmlns:a14="http://schemas.microsoft.com/office/drawing/2010/main" xmlns="" w="9525">
                   <a:solidFill>
                     <a:srgbClr val="000000"/>
                   </a:solidFill>
@@ -1933,7 +1933,7 @@
             </a:ln>
             <a:extLst>
               <a:ext uri="{91240B29-F687-4f45-9708-019B960494DF}">
-                <a14:hiddenLine xmlns="" xmlns:a14="http://schemas.microsoft.com/office/drawing/2010/main" w="9525">
+                <a14:hiddenLine xmlns:a14="http://schemas.microsoft.com/office/drawing/2010/main" xmlns="" w="9525">
                   <a:solidFill>
                     <a:srgbClr val="000000"/>
                   </a:solidFill>
@@ -2023,7 +2023,7 @@
             </a:ln>
             <a:extLst>
               <a:ext uri="{91240B29-F687-4f45-9708-019B960494DF}">
-                <a14:hiddenLine xmlns="" xmlns:a14="http://schemas.microsoft.com/office/drawing/2010/main" w="9525">
+                <a14:hiddenLine xmlns:a14="http://schemas.microsoft.com/office/drawing/2010/main" xmlns="" w="9525">
                   <a:solidFill>
                     <a:srgbClr val="000000"/>
                   </a:solidFill>
@@ -2085,7 +2085,7 @@
             </a:ln>
             <a:extLst>
               <a:ext uri="{91240B29-F687-4f45-9708-019B960494DF}">
-                <a14:hiddenLine xmlns="" xmlns:a14="http://schemas.microsoft.com/office/drawing/2010/main" w="9525">
+                <a14:hiddenLine xmlns:a14="http://schemas.microsoft.com/office/drawing/2010/main" xmlns="" w="9525">
                   <a:solidFill>
                     <a:srgbClr val="000000"/>
                   </a:solidFill>
@@ -2175,7 +2175,7 @@
             </a:ln>
             <a:extLst>
               <a:ext uri="{91240B29-F687-4f45-9708-019B960494DF}">
-                <a14:hiddenLine xmlns="" xmlns:a14="http://schemas.microsoft.com/office/drawing/2010/main" w="9525">
+                <a14:hiddenLine xmlns:a14="http://schemas.microsoft.com/office/drawing/2010/main" xmlns="" w="9525">
                   <a:solidFill>
                     <a:srgbClr val="000000"/>
                   </a:solidFill>
@@ -2265,7 +2265,7 @@
             </a:ln>
             <a:extLst>
               <a:ext uri="{91240B29-F687-4f45-9708-019B960494DF}">
-                <a14:hiddenLine xmlns="" xmlns:a14="http://schemas.microsoft.com/office/drawing/2010/main" w="9525">
+                <a14:hiddenLine xmlns:a14="http://schemas.microsoft.com/office/drawing/2010/main" xmlns="" w="9525">
                   <a:solidFill>
                     <a:srgbClr val="000000"/>
                   </a:solidFill>
@@ -2321,7 +2321,7 @@
             </a:ln>
             <a:extLst>
               <a:ext uri="{91240B29-F687-4f45-9708-019B960494DF}">
-                <a14:hiddenLine xmlns="" xmlns:a14="http://schemas.microsoft.com/office/drawing/2010/main" w="9525">
+                <a14:hiddenLine xmlns:a14="http://schemas.microsoft.com/office/drawing/2010/main" xmlns="" w="9525">
                   <a:solidFill>
                     <a:srgbClr val="000000"/>
                   </a:solidFill>
@@ -2411,7 +2411,7 @@
             </a:ln>
             <a:extLst>
               <a:ext uri="{91240B29-F687-4f45-9708-019B960494DF}">
-                <a14:hiddenLine xmlns="" xmlns:a14="http://schemas.microsoft.com/office/drawing/2010/main" w="9525">
+                <a14:hiddenLine xmlns:a14="http://schemas.microsoft.com/office/drawing/2010/main" xmlns="" w="9525">
                   <a:solidFill>
                     <a:srgbClr val="000000"/>
                   </a:solidFill>
@@ -2467,7 +2467,7 @@
             </a:ln>
             <a:extLst>
               <a:ext uri="{91240B29-F687-4f45-9708-019B960494DF}">
-                <a14:hiddenLine xmlns="" xmlns:a14="http://schemas.microsoft.com/office/drawing/2010/main" w="9525">
+                <a14:hiddenLine xmlns:a14="http://schemas.microsoft.com/office/drawing/2010/main" xmlns="" w="9525">
                   <a:solidFill>
                     <a:srgbClr val="000000"/>
                   </a:solidFill>
@@ -2557,7 +2557,7 @@
             </a:ln>
             <a:extLst>
               <a:ext uri="{91240B29-F687-4f45-9708-019B960494DF}">
-                <a14:hiddenLine xmlns="" xmlns:a14="http://schemas.microsoft.com/office/drawing/2010/main" w="9525">
+                <a14:hiddenLine xmlns:a14="http://schemas.microsoft.com/office/drawing/2010/main" xmlns="" w="9525">
                   <a:solidFill>
                     <a:srgbClr val="000000"/>
                   </a:solidFill>
@@ -2625,7 +2625,7 @@
             </a:ln>
             <a:extLst>
               <a:ext uri="{91240B29-F687-4f45-9708-019B960494DF}">
-                <a14:hiddenLine xmlns="" xmlns:a14="http://schemas.microsoft.com/office/drawing/2010/main" w="9525">
+                <a14:hiddenLine xmlns:a14="http://schemas.microsoft.com/office/drawing/2010/main" xmlns="" w="9525">
                   <a:solidFill>
                     <a:srgbClr val="000000"/>
                   </a:solidFill>
@@ -2715,7 +2715,7 @@
             </a:ln>
             <a:extLst>
               <a:ext uri="{91240B29-F687-4f45-9708-019B960494DF}">
-                <a14:hiddenLine xmlns="" xmlns:a14="http://schemas.microsoft.com/office/drawing/2010/main" w="9525">
+                <a14:hiddenLine xmlns:a14="http://schemas.microsoft.com/office/drawing/2010/main" xmlns="" w="9525">
                   <a:solidFill>
                     <a:srgbClr val="000000"/>
                   </a:solidFill>
@@ -2783,7 +2783,7 @@
             </a:ln>
             <a:extLst>
               <a:ext uri="{91240B29-F687-4f45-9708-019B960494DF}">
-                <a14:hiddenLine xmlns="" xmlns:a14="http://schemas.microsoft.com/office/drawing/2010/main" w="9525">
+                <a14:hiddenLine xmlns:a14="http://schemas.microsoft.com/office/drawing/2010/main" xmlns="" w="9525">
                   <a:solidFill>
                     <a:srgbClr val="000000"/>
                   </a:solidFill>
@@ -2873,7 +2873,7 @@
             </a:ln>
             <a:extLst>
               <a:ext uri="{91240B29-F687-4f45-9708-019B960494DF}">
-                <a14:hiddenLine xmlns="" xmlns:a14="http://schemas.microsoft.com/office/drawing/2010/main" w="9525">
+                <a14:hiddenLine xmlns:a14="http://schemas.microsoft.com/office/drawing/2010/main" xmlns="" w="9525">
                   <a:solidFill>
                     <a:srgbClr val="000000"/>
                   </a:solidFill>
@@ -2907,7 +2907,7 @@
             </a:ln>
             <a:extLst>
               <a:ext uri="{91240B29-F687-4f45-9708-019B960494DF}">
-                <a14:hiddenLine xmlns="" xmlns:a14="http://schemas.microsoft.com/office/drawing/2010/main" w="9525">
+                <a14:hiddenLine xmlns:a14="http://schemas.microsoft.com/office/drawing/2010/main" xmlns="" w="9525">
                   <a:solidFill>
                     <a:srgbClr val="000000"/>
                   </a:solidFill>
@@ -2997,7 +2997,7 @@
             </a:ln>
             <a:extLst>
               <a:ext uri="{91240B29-F687-4f45-9708-019B960494DF}">
-                <a14:hiddenLine xmlns="" xmlns:a14="http://schemas.microsoft.com/office/drawing/2010/main" w="9525">
+                <a14:hiddenLine xmlns:a14="http://schemas.microsoft.com/office/drawing/2010/main" xmlns="" w="9525">
                   <a:solidFill>
                     <a:srgbClr val="000000"/>
                   </a:solidFill>
@@ -3059,7 +3059,7 @@
             </a:ln>
             <a:extLst>
               <a:ext uri="{91240B29-F687-4f45-9708-019B960494DF}">
-                <a14:hiddenLine xmlns="" xmlns:a14="http://schemas.microsoft.com/office/drawing/2010/main" w="9525">
+                <a14:hiddenLine xmlns:a14="http://schemas.microsoft.com/office/drawing/2010/main" xmlns="" w="9525">
                   <a:solidFill>
                     <a:srgbClr val="000000"/>
                   </a:solidFill>
@@ -3121,7 +3121,7 @@
             </a:ln>
             <a:extLst>
               <a:ext uri="{91240B29-F687-4f45-9708-019B960494DF}">
-                <a14:hiddenLine xmlns="" xmlns:a14="http://schemas.microsoft.com/office/drawing/2010/main" w="9525">
+                <a14:hiddenLine xmlns:a14="http://schemas.microsoft.com/office/drawing/2010/main" xmlns="" w="9525">
                   <a:solidFill>
                     <a:srgbClr val="000000"/>
                   </a:solidFill>
@@ -3211,7 +3211,7 @@
             </a:ln>
             <a:extLst>
               <a:ext uri="{91240B29-F687-4f45-9708-019B960494DF}">
-                <a14:hiddenLine xmlns="" xmlns:a14="http://schemas.microsoft.com/office/drawing/2010/main" w="9525">
+                <a14:hiddenLine xmlns:a14="http://schemas.microsoft.com/office/drawing/2010/main" xmlns="" w="9525">
                   <a:solidFill>
                     <a:srgbClr val="000000"/>
                   </a:solidFill>
@@ -3279,7 +3279,7 @@
             </a:ln>
             <a:extLst>
               <a:ext uri="{91240B29-F687-4f45-9708-019B960494DF}">
-                <a14:hiddenLine xmlns="" xmlns:a14="http://schemas.microsoft.com/office/drawing/2010/main" w="9525">
+                <a14:hiddenLine xmlns:a14="http://schemas.microsoft.com/office/drawing/2010/main" xmlns="" w="9525">
                   <a:solidFill>
                     <a:srgbClr val="000000"/>
                   </a:solidFill>
@@ -3341,7 +3341,7 @@
             </a:ln>
             <a:extLst>
               <a:ext uri="{91240B29-F687-4f45-9708-019B960494DF}">
-                <a14:hiddenLine xmlns="" xmlns:a14="http://schemas.microsoft.com/office/drawing/2010/main" w="9525">
+                <a14:hiddenLine xmlns:a14="http://schemas.microsoft.com/office/drawing/2010/main" xmlns="" w="9525">
                   <a:solidFill>
                     <a:srgbClr val="000000"/>
                   </a:solidFill>
@@ -3431,7 +3431,7 @@
             </a:ln>
             <a:extLst>
               <a:ext uri="{91240B29-F687-4f45-9708-019B960494DF}">
-                <a14:hiddenLine xmlns="" xmlns:a14="http://schemas.microsoft.com/office/drawing/2010/main" w="9525">
+                <a14:hiddenLine xmlns:a14="http://schemas.microsoft.com/office/drawing/2010/main" xmlns="" w="9525">
                   <a:solidFill>
                     <a:srgbClr val="000000"/>
                   </a:solidFill>
@@ -3493,7 +3493,7 @@
             </a:ln>
             <a:extLst>
               <a:ext uri="{91240B29-F687-4f45-9708-019B960494DF}">
-                <a14:hiddenLine xmlns="" xmlns:a14="http://schemas.microsoft.com/office/drawing/2010/main" w="9525">
+                <a14:hiddenLine xmlns:a14="http://schemas.microsoft.com/office/drawing/2010/main" xmlns="" w="9525">
                   <a:solidFill>
                     <a:srgbClr val="000000"/>
                   </a:solidFill>
@@ -3583,7 +3583,7 @@
             </a:ln>
             <a:extLst>
               <a:ext uri="{91240B29-F687-4f45-9708-019B960494DF}">
-                <a14:hiddenLine xmlns="" xmlns:a14="http://schemas.microsoft.com/office/drawing/2010/main" w="9525">
+                <a14:hiddenLine xmlns:a14="http://schemas.microsoft.com/office/drawing/2010/main" xmlns="" w="9525">
                   <a:solidFill>
                     <a:srgbClr val="000000"/>
                   </a:solidFill>
@@ -3645,7 +3645,7 @@
             </a:ln>
             <a:extLst>
               <a:ext uri="{91240B29-F687-4f45-9708-019B960494DF}">
-                <a14:hiddenLine xmlns="" xmlns:a14="http://schemas.microsoft.com/office/drawing/2010/main" w="9525">
+                <a14:hiddenLine xmlns:a14="http://schemas.microsoft.com/office/drawing/2010/main" xmlns="" w="9525">
                   <a:solidFill>
                     <a:srgbClr val="000000"/>
                   </a:solidFill>
@@ -3735,7 +3735,7 @@
             </a:ln>
             <a:extLst>
               <a:ext uri="{91240B29-F687-4f45-9708-019B960494DF}">
-                <a14:hiddenLine xmlns="" xmlns:a14="http://schemas.microsoft.com/office/drawing/2010/main" w="9525">
+                <a14:hiddenLine xmlns:a14="http://schemas.microsoft.com/office/drawing/2010/main" xmlns="" w="9525">
                   <a:solidFill>
                     <a:srgbClr val="000000"/>
                   </a:solidFill>
@@ -3769,7 +3769,7 @@
             </a:ln>
             <a:extLst>
               <a:ext uri="{91240B29-F687-4f45-9708-019B960494DF}">
-                <a14:hiddenLine xmlns="" xmlns:a14="http://schemas.microsoft.com/office/drawing/2010/main" w="9525">
+                <a14:hiddenLine xmlns:a14="http://schemas.microsoft.com/office/drawing/2010/main" xmlns="" w="9525">
                   <a:solidFill>
                     <a:srgbClr val="000000"/>
                   </a:solidFill>
@@ -3834,7 +3834,7 @@
             </a:ln>
             <a:extLst>
               <a:ext uri="{91240B29-F687-4f45-9708-019B960494DF}">
-                <a14:hiddenLine xmlns="" xmlns:a14="http://schemas.microsoft.com/office/drawing/2010/main" w="9525">
+                <a14:hiddenLine xmlns:a14="http://schemas.microsoft.com/office/drawing/2010/main" xmlns="" w="9525">
                   <a:solidFill>
                     <a:srgbClr val="000000"/>
                   </a:solidFill>
@@ -3924,7 +3924,7 @@
             </a:ln>
             <a:extLst>
               <a:ext uri="{91240B29-F687-4f45-9708-019B960494DF}">
-                <a14:hiddenLine xmlns="" xmlns:a14="http://schemas.microsoft.com/office/drawing/2010/main" w="9525">
+                <a14:hiddenLine xmlns:a14="http://schemas.microsoft.com/office/drawing/2010/main" xmlns="" w="9525">
                   <a:solidFill>
                     <a:srgbClr val="000000"/>
                   </a:solidFill>
@@ -3986,7 +3986,7 @@
             </a:ln>
             <a:extLst>
               <a:ext uri="{91240B29-F687-4f45-9708-019B960494DF}">
-                <a14:hiddenLine xmlns="" xmlns:a14="http://schemas.microsoft.com/office/drawing/2010/main" w="9525">
+                <a14:hiddenLine xmlns:a14="http://schemas.microsoft.com/office/drawing/2010/main" xmlns="" w="9525">
                   <a:solidFill>
                     <a:srgbClr val="000000"/>
                   </a:solidFill>
@@ -4076,7 +4076,7 @@
             </a:ln>
             <a:extLst>
               <a:ext uri="{91240B29-F687-4f45-9708-019B960494DF}">
-                <a14:hiddenLine xmlns="" xmlns:a14="http://schemas.microsoft.com/office/drawing/2010/main" w="9525">
+                <a14:hiddenLine xmlns:a14="http://schemas.microsoft.com/office/drawing/2010/main" xmlns="" w="9525">
                   <a:solidFill>
                     <a:srgbClr val="000000"/>
                   </a:solidFill>
@@ -4166,7 +4166,7 @@
             </a:ln>
             <a:extLst>
               <a:ext uri="{91240B29-F687-4f45-9708-019B960494DF}">
-                <a14:hiddenLine xmlns="" xmlns:a14="http://schemas.microsoft.com/office/drawing/2010/main" w="9525">
+                <a14:hiddenLine xmlns:a14="http://schemas.microsoft.com/office/drawing/2010/main" xmlns="" w="9525">
                   <a:solidFill>
                     <a:srgbClr val="000000"/>
                   </a:solidFill>
@@ -4231,7 +4231,7 @@
             </a:ln>
             <a:extLst>
               <a:ext uri="{91240B29-F687-4f45-9708-019B960494DF}">
-                <a14:hiddenLine xmlns="" xmlns:a14="http://schemas.microsoft.com/office/drawing/2010/main" w="9525">
+                <a14:hiddenLine xmlns:a14="http://schemas.microsoft.com/office/drawing/2010/main" xmlns="" w="9525">
                   <a:solidFill>
                     <a:srgbClr val="000000"/>
                   </a:solidFill>
@@ -4293,7 +4293,7 @@
             </a:ln>
             <a:extLst>
               <a:ext uri="{91240B29-F687-4f45-9708-019B960494DF}">
-                <a14:hiddenLine xmlns="" xmlns:a14="http://schemas.microsoft.com/office/drawing/2010/main" w="9525">
+                <a14:hiddenLine xmlns:a14="http://schemas.microsoft.com/office/drawing/2010/main" xmlns="" w="9525">
                   <a:solidFill>
                     <a:srgbClr val="000000"/>
                   </a:solidFill>
@@ -4383,7 +4383,7 @@
             </a:ln>
             <a:extLst>
               <a:ext uri="{91240B29-F687-4f45-9708-019B960494DF}">
-                <a14:hiddenLine xmlns="" xmlns:a14="http://schemas.microsoft.com/office/drawing/2010/main" w="9525">
+                <a14:hiddenLine xmlns:a14="http://schemas.microsoft.com/office/drawing/2010/main" xmlns="" w="9525">
                   <a:solidFill>
                     <a:srgbClr val="000000"/>
                   </a:solidFill>
@@ -4473,7 +4473,7 @@
             </a:ln>
             <a:extLst>
               <a:ext uri="{91240B29-F687-4f45-9708-019B960494DF}">
-                <a14:hiddenLine xmlns="" xmlns:a14="http://schemas.microsoft.com/office/drawing/2010/main" w="9525">
+                <a14:hiddenLine xmlns:a14="http://schemas.microsoft.com/office/drawing/2010/main" xmlns="" w="9525">
                   <a:solidFill>
                     <a:srgbClr val="000000"/>
                   </a:solidFill>
@@ -4535,7 +4535,7 @@
             </a:ln>
             <a:extLst>
               <a:ext uri="{91240B29-F687-4f45-9708-019B960494DF}">
-                <a14:hiddenLine xmlns="" xmlns:a14="http://schemas.microsoft.com/office/drawing/2010/main" w="9525">
+                <a14:hiddenLine xmlns:a14="http://schemas.microsoft.com/office/drawing/2010/main" xmlns="" w="9525">
                   <a:solidFill>
                     <a:srgbClr val="000000"/>
                   </a:solidFill>
@@ -4655,7 +4655,7 @@
             </a:ln>
             <a:extLst>
               <a:ext uri="{91240B29-F687-4f45-9708-019B960494DF}">
-                <a14:hiddenLine xmlns="" xmlns:a14="http://schemas.microsoft.com/office/drawing/2010/main" w="9525">
+                <a14:hiddenLine xmlns:a14="http://schemas.microsoft.com/office/drawing/2010/main" xmlns="" w="9525">
                   <a:solidFill>
                     <a:srgbClr val="000000"/>
                   </a:solidFill>
@@ -4723,7 +4723,7 @@
             </a:ln>
             <a:extLst>
               <a:ext uri="{91240B29-F687-4f45-9708-019B960494DF}">
-                <a14:hiddenLine xmlns="" xmlns:a14="http://schemas.microsoft.com/office/drawing/2010/main" w="9525">
+                <a14:hiddenLine xmlns:a14="http://schemas.microsoft.com/office/drawing/2010/main" xmlns="" w="9525">
                   <a:solidFill>
                     <a:srgbClr val="000000"/>
                   </a:solidFill>
@@ -4813,7 +4813,7 @@
             </a:ln>
             <a:extLst>
               <a:ext uri="{91240B29-F687-4f45-9708-019B960494DF}">
-                <a14:hiddenLine xmlns="" xmlns:a14="http://schemas.microsoft.com/office/drawing/2010/main" w="9525">
+                <a14:hiddenLine xmlns:a14="http://schemas.microsoft.com/office/drawing/2010/main" xmlns="" w="9525">
                   <a:solidFill>
                     <a:srgbClr val="000000"/>
                   </a:solidFill>
@@ -4953,7 +4953,7 @@
           <a:p>
             <a:fld id="{EC4347D3-4C9A-C240-8F14-750059DFEEB0}" type="datetimeFigureOut">
               <a:rPr lang="en-US" smtClean="0"/>
-              <a:t>5/15/25</a:t>
+              <a:t>5/19/25</a:t>
             </a:fld>
             <a:endParaRPr lang="en-US"/>
           </a:p>
@@ -5220,7 +5220,7 @@
           <a:p>
             <a:fld id="{EC4347D3-4C9A-C240-8F14-750059DFEEB0}" type="datetimeFigureOut">
               <a:rPr lang="en-US" smtClean="0"/>
-              <a:t>5/15/25</a:t>
+              <a:t>5/19/25</a:t>
             </a:fld>
             <a:endParaRPr lang="en-US"/>
           </a:p>
@@ -5416,7 +5416,7 @@
           <a:p>
             <a:fld id="{EC4347D3-4C9A-C240-8F14-750059DFEEB0}" type="datetimeFigureOut">
               <a:rPr lang="en-US" smtClean="0"/>
-              <a:t>5/15/25</a:t>
+              <a:t>5/19/25</a:t>
             </a:fld>
             <a:endParaRPr lang="en-US"/>
           </a:p>
@@ -5679,7 +5679,7 @@
           <a:p>
             <a:fld id="{EC4347D3-4C9A-C240-8F14-750059DFEEB0}" type="datetimeFigureOut">
               <a:rPr lang="en-US" smtClean="0"/>
-              <a:t>5/15/25</a:t>
+              <a:t>5/19/25</a:t>
             </a:fld>
             <a:endParaRPr lang="en-US"/>
           </a:p>
@@ -6113,7 +6113,7 @@
           <a:p>
             <a:fld id="{EC4347D3-4C9A-C240-8F14-750059DFEEB0}" type="datetimeFigureOut">
               <a:rPr lang="en-US" smtClean="0"/>
-              <a:t>5/15/25</a:t>
+              <a:t>5/19/25</a:t>
             </a:fld>
             <a:endParaRPr lang="en-US"/>
           </a:p>
@@ -6659,7 +6659,7 @@
           <a:p>
             <a:fld id="{EC4347D3-4C9A-C240-8F14-750059DFEEB0}" type="datetimeFigureOut">
               <a:rPr lang="en-US" smtClean="0"/>
-              <a:t>5/15/25</a:t>
+              <a:t>5/19/25</a:t>
             </a:fld>
             <a:endParaRPr lang="en-US"/>
           </a:p>
@@ -7379,7 +7379,7 @@
           <a:p>
             <a:fld id="{EC4347D3-4C9A-C240-8F14-750059DFEEB0}" type="datetimeFigureOut">
               <a:rPr lang="en-US" smtClean="0"/>
-              <a:t>5/15/25</a:t>
+              <a:t>5/19/25</a:t>
             </a:fld>
             <a:endParaRPr lang="en-US"/>
           </a:p>
@@ -7549,7 +7549,7 @@
           <a:p>
             <a:fld id="{EC4347D3-4C9A-C240-8F14-750059DFEEB0}" type="datetimeFigureOut">
               <a:rPr lang="en-US" smtClean="0"/>
-              <a:t>5/15/25</a:t>
+              <a:t>5/19/25</a:t>
             </a:fld>
             <a:endParaRPr lang="en-US"/>
           </a:p>
@@ -7729,7 +7729,7 @@
           <a:p>
             <a:fld id="{EC4347D3-4C9A-C240-8F14-750059DFEEB0}" type="datetimeFigureOut">
               <a:rPr lang="en-US" smtClean="0"/>
-              <a:t>5/15/25</a:t>
+              <a:t>5/19/25</a:t>
             </a:fld>
             <a:endParaRPr lang="en-US"/>
           </a:p>
@@ -7899,7 +7899,7 @@
           <a:p>
             <a:fld id="{EC4347D3-4C9A-C240-8F14-750059DFEEB0}" type="datetimeFigureOut">
               <a:rPr lang="en-US" smtClean="0"/>
-              <a:t>5/15/25</a:t>
+              <a:t>5/19/25</a:t>
             </a:fld>
             <a:endParaRPr lang="en-US"/>
           </a:p>
@@ -8149,7 +8149,7 @@
           <a:p>
             <a:fld id="{EC4347D3-4C9A-C240-8F14-750059DFEEB0}" type="datetimeFigureOut">
               <a:rPr lang="en-US" smtClean="0"/>
-              <a:t>5/15/25</a:t>
+              <a:t>5/19/25</a:t>
             </a:fld>
             <a:endParaRPr lang="en-US"/>
           </a:p>
@@ -8381,7 +8381,7 @@
           <a:p>
             <a:fld id="{EC4347D3-4C9A-C240-8F14-750059DFEEB0}" type="datetimeFigureOut">
               <a:rPr lang="en-US" smtClean="0"/>
-              <a:t>5/15/25</a:t>
+              <a:t>5/19/25</a:t>
             </a:fld>
             <a:endParaRPr lang="en-US"/>
           </a:p>
@@ -8767,7 +8767,7 @@
           <a:p>
             <a:fld id="{EC4347D3-4C9A-C240-8F14-750059DFEEB0}" type="datetimeFigureOut">
               <a:rPr lang="en-US" smtClean="0"/>
-              <a:t>5/15/25</a:t>
+              <a:t>5/19/25</a:t>
             </a:fld>
             <a:endParaRPr lang="en-US"/>
           </a:p>
@@ -8890,7 +8890,7 @@
           <a:p>
             <a:fld id="{EC4347D3-4C9A-C240-8F14-750059DFEEB0}" type="datetimeFigureOut">
               <a:rPr lang="en-US" smtClean="0"/>
-              <a:t>5/15/25</a:t>
+              <a:t>5/19/25</a:t>
             </a:fld>
             <a:endParaRPr lang="en-US"/>
           </a:p>
@@ -8985,7 +8985,7 @@
           <a:p>
             <a:fld id="{EC4347D3-4C9A-C240-8F14-750059DFEEB0}" type="datetimeFigureOut">
               <a:rPr lang="en-US" smtClean="0"/>
-              <a:t>5/15/25</a:t>
+              <a:t>5/19/25</a:t>
             </a:fld>
             <a:endParaRPr lang="en-US"/>
           </a:p>
@@ -9234,7 +9234,7 @@
           <a:p>
             <a:fld id="{EC4347D3-4C9A-C240-8F14-750059DFEEB0}" type="datetimeFigureOut">
               <a:rPr lang="en-US" smtClean="0"/>
-              <a:t>5/15/25</a:t>
+              <a:t>5/19/25</a:t>
             </a:fld>
             <a:endParaRPr lang="en-US"/>
           </a:p>
@@ -9519,7 +9519,7 @@
           <a:p>
             <a:fld id="{EC4347D3-4C9A-C240-8F14-750059DFEEB0}" type="datetimeFigureOut">
               <a:rPr lang="en-US" smtClean="0"/>
-              <a:t>5/15/25</a:t>
+              <a:t>5/19/25</a:t>
             </a:fld>
             <a:endParaRPr lang="en-US"/>
           </a:p>
@@ -9642,7 +9642,7 @@
           <a:noFill/>
           <a:extLst>
             <a:ext uri="{909E8E84-426E-40dd-AFC4-6F175D3DCCD1}">
-              <a14:hiddenFill xmlns="" xmlns:a14="http://schemas.microsoft.com/office/drawing/2010/main">
+              <a14:hiddenFill xmlns:a14="http://schemas.microsoft.com/office/drawing/2010/main" xmlns="">
                 <a:solidFill>
                   <a:srgbClr val="FFFFFF"/>
                 </a:solidFill>
@@ -9716,7 +9716,7 @@
               </a:ln>
               <a:extLst>
                 <a:ext uri="{91240B29-F687-4f45-9708-019B960494DF}">
-                  <a14:hiddenLine xmlns="" xmlns:a14="http://schemas.microsoft.com/office/drawing/2010/main" w="9525">
+                  <a14:hiddenLine xmlns:a14="http://schemas.microsoft.com/office/drawing/2010/main" xmlns="" w="9525">
                     <a:solidFill>
                       <a:srgbClr val="000000"/>
                     </a:solidFill>
@@ -9806,7 +9806,7 @@
               </a:ln>
               <a:extLst>
                 <a:ext uri="{91240B29-F687-4f45-9708-019B960494DF}">
-                  <a14:hiddenLine xmlns="" xmlns:a14="http://schemas.microsoft.com/office/drawing/2010/main" w="9525">
+                  <a14:hiddenLine xmlns:a14="http://schemas.microsoft.com/office/drawing/2010/main" xmlns="" w="9525">
                     <a:solidFill>
                       <a:srgbClr val="000000"/>
                     </a:solidFill>
@@ -9896,7 +9896,7 @@
               </a:ln>
               <a:extLst>
                 <a:ext uri="{91240B29-F687-4f45-9708-019B960494DF}">
-                  <a14:hiddenLine xmlns="" xmlns:a14="http://schemas.microsoft.com/office/drawing/2010/main" w="9525">
+                  <a14:hiddenLine xmlns:a14="http://schemas.microsoft.com/office/drawing/2010/main" xmlns="" w="9525">
                     <a:solidFill>
                       <a:srgbClr val="000000"/>
                     </a:solidFill>
@@ -9958,7 +9958,7 @@
               </a:ln>
               <a:extLst>
                 <a:ext uri="{91240B29-F687-4f45-9708-019B960494DF}">
-                  <a14:hiddenLine xmlns="" xmlns:a14="http://schemas.microsoft.com/office/drawing/2010/main" w="9525">
+                  <a14:hiddenLine xmlns:a14="http://schemas.microsoft.com/office/drawing/2010/main" xmlns="" w="9525">
                     <a:solidFill>
                       <a:srgbClr val="000000"/>
                     </a:solidFill>
@@ -10048,7 +10048,7 @@
               </a:ln>
               <a:extLst>
                 <a:ext uri="{91240B29-F687-4f45-9708-019B960494DF}">
-                  <a14:hiddenLine xmlns="" xmlns:a14="http://schemas.microsoft.com/office/drawing/2010/main" w="9525">
+                  <a14:hiddenLine xmlns:a14="http://schemas.microsoft.com/office/drawing/2010/main" xmlns="" w="9525">
                     <a:solidFill>
                       <a:srgbClr val="000000"/>
                     </a:solidFill>
@@ -10110,7 +10110,7 @@
               </a:ln>
               <a:extLst>
                 <a:ext uri="{91240B29-F687-4f45-9708-019B960494DF}">
-                  <a14:hiddenLine xmlns="" xmlns:a14="http://schemas.microsoft.com/office/drawing/2010/main" w="9525">
+                  <a14:hiddenLine xmlns:a14="http://schemas.microsoft.com/office/drawing/2010/main" xmlns="" w="9525">
                     <a:solidFill>
                       <a:srgbClr val="000000"/>
                     </a:solidFill>
@@ -10172,7 +10172,7 @@
               </a:ln>
               <a:extLst>
                 <a:ext uri="{91240B29-F687-4f45-9708-019B960494DF}">
-                  <a14:hiddenLine xmlns="" xmlns:a14="http://schemas.microsoft.com/office/drawing/2010/main" w="9525">
+                  <a14:hiddenLine xmlns:a14="http://schemas.microsoft.com/office/drawing/2010/main" xmlns="" w="9525">
                     <a:solidFill>
                       <a:srgbClr val="000000"/>
                     </a:solidFill>
@@ -10262,7 +10262,7 @@
               </a:ln>
               <a:extLst>
                 <a:ext uri="{91240B29-F687-4f45-9708-019B960494DF}">
-                  <a14:hiddenLine xmlns="" xmlns:a14="http://schemas.microsoft.com/office/drawing/2010/main" w="9525">
+                  <a14:hiddenLine xmlns:a14="http://schemas.microsoft.com/office/drawing/2010/main" xmlns="" w="9525">
                     <a:solidFill>
                       <a:srgbClr val="000000"/>
                     </a:solidFill>
@@ -10352,7 +10352,7 @@
               </a:ln>
               <a:extLst>
                 <a:ext uri="{91240B29-F687-4f45-9708-019B960494DF}">
-                  <a14:hiddenLine xmlns="" xmlns:a14="http://schemas.microsoft.com/office/drawing/2010/main" w="9525">
+                  <a14:hiddenLine xmlns:a14="http://schemas.microsoft.com/office/drawing/2010/main" xmlns="" w="9525">
                     <a:solidFill>
                       <a:srgbClr val="000000"/>
                     </a:solidFill>
@@ -10414,7 +10414,7 @@
               </a:ln>
               <a:extLst>
                 <a:ext uri="{91240B29-F687-4f45-9708-019B960494DF}">
-                  <a14:hiddenLine xmlns="" xmlns:a14="http://schemas.microsoft.com/office/drawing/2010/main" w="9525">
+                  <a14:hiddenLine xmlns:a14="http://schemas.microsoft.com/office/drawing/2010/main" xmlns="" w="9525">
                     <a:solidFill>
                       <a:srgbClr val="000000"/>
                     </a:solidFill>
@@ -10524,7 +10524,7 @@
               </a:ln>
               <a:extLst>
                 <a:ext uri="{91240B29-F687-4f45-9708-019B960494DF}">
-                  <a14:hiddenLine xmlns="" xmlns:a14="http://schemas.microsoft.com/office/drawing/2010/main" w="9525">
+                  <a14:hiddenLine xmlns:a14="http://schemas.microsoft.com/office/drawing/2010/main" xmlns="" w="9525">
                     <a:solidFill>
                       <a:srgbClr val="000000"/>
                     </a:solidFill>
@@ -10608,7 +10608,7 @@
               </a:ln>
               <a:extLst>
                 <a:ext uri="{91240B29-F687-4f45-9708-019B960494DF}">
-                  <a14:hiddenLine xmlns="" xmlns:a14="http://schemas.microsoft.com/office/drawing/2010/main" w="9525">
+                  <a14:hiddenLine xmlns:a14="http://schemas.microsoft.com/office/drawing/2010/main" xmlns="" w="9525">
                     <a:solidFill>
                       <a:srgbClr val="000000"/>
                     </a:solidFill>
@@ -10670,7 +10670,7 @@
               </a:ln>
               <a:extLst>
                 <a:ext uri="{91240B29-F687-4f45-9708-019B960494DF}">
-                  <a14:hiddenLine xmlns="" xmlns:a14="http://schemas.microsoft.com/office/drawing/2010/main" w="9525">
+                  <a14:hiddenLine xmlns:a14="http://schemas.microsoft.com/office/drawing/2010/main" xmlns="" w="9525">
                     <a:solidFill>
                       <a:srgbClr val="000000"/>
                     </a:solidFill>
@@ -10732,7 +10732,7 @@
               </a:ln>
               <a:extLst>
                 <a:ext uri="{91240B29-F687-4f45-9708-019B960494DF}">
-                  <a14:hiddenLine xmlns="" xmlns:a14="http://schemas.microsoft.com/office/drawing/2010/main" w="9525">
+                  <a14:hiddenLine xmlns:a14="http://schemas.microsoft.com/office/drawing/2010/main" xmlns="" w="9525">
                     <a:solidFill>
                       <a:srgbClr val="000000"/>
                     </a:solidFill>
@@ -10822,7 +10822,7 @@
               </a:ln>
               <a:extLst>
                 <a:ext uri="{91240B29-F687-4f45-9708-019B960494DF}">
-                  <a14:hiddenLine xmlns="" xmlns:a14="http://schemas.microsoft.com/office/drawing/2010/main" w="9525">
+                  <a14:hiddenLine xmlns:a14="http://schemas.microsoft.com/office/drawing/2010/main" xmlns="" w="9525">
                     <a:solidFill>
                       <a:srgbClr val="000000"/>
                     </a:solidFill>
@@ -10856,7 +10856,7 @@
               </a:ln>
               <a:extLst>
                 <a:ext uri="{91240B29-F687-4f45-9708-019B960494DF}">
-                  <a14:hiddenLine xmlns="" xmlns:a14="http://schemas.microsoft.com/office/drawing/2010/main" w="9525">
+                  <a14:hiddenLine xmlns:a14="http://schemas.microsoft.com/office/drawing/2010/main" xmlns="" w="9525">
                     <a:solidFill>
                       <a:srgbClr val="000000"/>
                     </a:solidFill>
@@ -10921,7 +10921,7 @@
               </a:ln>
               <a:extLst>
                 <a:ext uri="{91240B29-F687-4f45-9708-019B960494DF}">
-                  <a14:hiddenLine xmlns="" xmlns:a14="http://schemas.microsoft.com/office/drawing/2010/main" w="9525">
+                  <a14:hiddenLine xmlns:a14="http://schemas.microsoft.com/office/drawing/2010/main" xmlns="" w="9525">
                     <a:solidFill>
                       <a:srgbClr val="000000"/>
                     </a:solidFill>
@@ -11011,7 +11011,7 @@
               </a:ln>
               <a:extLst>
                 <a:ext uri="{91240B29-F687-4f45-9708-019B960494DF}">
-                  <a14:hiddenLine xmlns="" xmlns:a14="http://schemas.microsoft.com/office/drawing/2010/main" w="9525">
+                  <a14:hiddenLine xmlns:a14="http://schemas.microsoft.com/office/drawing/2010/main" xmlns="" w="9525">
                     <a:solidFill>
                       <a:srgbClr val="000000"/>
                     </a:solidFill>
@@ -11073,7 +11073,7 @@
               </a:ln>
               <a:extLst>
                 <a:ext uri="{91240B29-F687-4f45-9708-019B960494DF}">
-                  <a14:hiddenLine xmlns="" xmlns:a14="http://schemas.microsoft.com/office/drawing/2010/main" w="9525">
+                  <a14:hiddenLine xmlns:a14="http://schemas.microsoft.com/office/drawing/2010/main" xmlns="" w="9525">
                     <a:solidFill>
                       <a:srgbClr val="000000"/>
                     </a:solidFill>
@@ -11163,7 +11163,7 @@
               </a:ln>
               <a:extLst>
                 <a:ext uri="{91240B29-F687-4f45-9708-019B960494DF}">
-                  <a14:hiddenLine xmlns="" xmlns:a14="http://schemas.microsoft.com/office/drawing/2010/main" w="9525">
+                  <a14:hiddenLine xmlns:a14="http://schemas.microsoft.com/office/drawing/2010/main" xmlns="" w="9525">
                     <a:solidFill>
                       <a:srgbClr val="000000"/>
                     </a:solidFill>
@@ -11228,7 +11228,7 @@
               </a:ln>
               <a:extLst>
                 <a:ext uri="{91240B29-F687-4f45-9708-019B960494DF}">
-                  <a14:hiddenLine xmlns="" xmlns:a14="http://schemas.microsoft.com/office/drawing/2010/main" w="9525">
+                  <a14:hiddenLine xmlns:a14="http://schemas.microsoft.com/office/drawing/2010/main" xmlns="" w="9525">
                     <a:solidFill>
                       <a:srgbClr val="000000"/>
                     </a:solidFill>
@@ -11290,7 +11290,7 @@
               </a:ln>
               <a:extLst>
                 <a:ext uri="{91240B29-F687-4f45-9708-019B960494DF}">
-                  <a14:hiddenLine xmlns="" xmlns:a14="http://schemas.microsoft.com/office/drawing/2010/main" w="9525">
+                  <a14:hiddenLine xmlns:a14="http://schemas.microsoft.com/office/drawing/2010/main" xmlns="" w="9525">
                     <a:solidFill>
                       <a:srgbClr val="000000"/>
                     </a:solidFill>
@@ -11380,7 +11380,7 @@
               </a:ln>
               <a:extLst>
                 <a:ext uri="{91240B29-F687-4f45-9708-019B960494DF}">
-                  <a14:hiddenLine xmlns="" xmlns:a14="http://schemas.microsoft.com/office/drawing/2010/main" w="9525">
+                  <a14:hiddenLine xmlns:a14="http://schemas.microsoft.com/office/drawing/2010/main" xmlns="" w="9525">
                     <a:solidFill>
                       <a:srgbClr val="000000"/>
                     </a:solidFill>
@@ -11470,7 +11470,7 @@
               </a:ln>
               <a:extLst>
                 <a:ext uri="{91240B29-F687-4f45-9708-019B960494DF}">
-                  <a14:hiddenLine xmlns="" xmlns:a14="http://schemas.microsoft.com/office/drawing/2010/main" w="9525">
+                  <a14:hiddenLine xmlns:a14="http://schemas.microsoft.com/office/drawing/2010/main" xmlns="" w="9525">
                     <a:solidFill>
                       <a:srgbClr val="000000"/>
                     </a:solidFill>
@@ -11535,7 +11535,7 @@
               </a:ln>
               <a:extLst>
                 <a:ext uri="{91240B29-F687-4f45-9708-019B960494DF}">
-                  <a14:hiddenLine xmlns="" xmlns:a14="http://schemas.microsoft.com/office/drawing/2010/main" w="9525">
+                  <a14:hiddenLine xmlns:a14="http://schemas.microsoft.com/office/drawing/2010/main" xmlns="" w="9525">
                     <a:solidFill>
                       <a:srgbClr val="000000"/>
                     </a:solidFill>
@@ -11655,7 +11655,7 @@
               </a:ln>
               <a:extLst>
                 <a:ext uri="{91240B29-F687-4f45-9708-019B960494DF}">
-                  <a14:hiddenLine xmlns="" xmlns:a14="http://schemas.microsoft.com/office/drawing/2010/main" w="9525">
+                  <a14:hiddenLine xmlns:a14="http://schemas.microsoft.com/office/drawing/2010/main" xmlns="" w="9525">
                     <a:solidFill>
                       <a:srgbClr val="000000"/>
                     </a:solidFill>
@@ -11736,7 +11736,7 @@
               </a:ln>
               <a:extLst>
                 <a:ext uri="{91240B29-F687-4f45-9708-019B960494DF}">
-                  <a14:hiddenLine xmlns="" xmlns:a14="http://schemas.microsoft.com/office/drawing/2010/main" w="9525">
+                  <a14:hiddenLine xmlns:a14="http://schemas.microsoft.com/office/drawing/2010/main" xmlns="" w="9525">
                     <a:solidFill>
                       <a:srgbClr val="000000"/>
                     </a:solidFill>
@@ -11851,7 +11851,7 @@
               </a:ln>
               <a:extLst>
                 <a:ext uri="{91240B29-F687-4f45-9708-019B960494DF}">
-                  <a14:hiddenLine xmlns="" xmlns:a14="http://schemas.microsoft.com/office/drawing/2010/main" w="9525">
+                  <a14:hiddenLine xmlns:a14="http://schemas.microsoft.com/office/drawing/2010/main" xmlns="" w="9525">
                     <a:solidFill>
                       <a:srgbClr val="000000"/>
                     </a:solidFill>
@@ -11941,7 +11941,7 @@
               </a:ln>
               <a:extLst>
                 <a:ext uri="{91240B29-F687-4f45-9708-019B960494DF}">
-                  <a14:hiddenLine xmlns="" xmlns:a14="http://schemas.microsoft.com/office/drawing/2010/main" w="9525">
+                  <a14:hiddenLine xmlns:a14="http://schemas.microsoft.com/office/drawing/2010/main" xmlns="" w="9525">
                     <a:solidFill>
                       <a:srgbClr val="000000"/>
                     </a:solidFill>
@@ -12006,7 +12006,7 @@
               </a:ln>
               <a:extLst>
                 <a:ext uri="{91240B29-F687-4f45-9708-019B960494DF}">
-                  <a14:hiddenLine xmlns="" xmlns:a14="http://schemas.microsoft.com/office/drawing/2010/main" w="9525">
+                  <a14:hiddenLine xmlns:a14="http://schemas.microsoft.com/office/drawing/2010/main" xmlns="" w="9525">
                     <a:solidFill>
                       <a:srgbClr val="000000"/>
                     </a:solidFill>
@@ -12096,7 +12096,7 @@
               </a:ln>
               <a:extLst>
                 <a:ext uri="{91240B29-F687-4f45-9708-019B960494DF}">
-                  <a14:hiddenLine xmlns="" xmlns:a14="http://schemas.microsoft.com/office/drawing/2010/main" w="9525">
+                  <a14:hiddenLine xmlns:a14="http://schemas.microsoft.com/office/drawing/2010/main" xmlns="" w="9525">
                     <a:solidFill>
                       <a:srgbClr val="000000"/>
                     </a:solidFill>
@@ -12164,7 +12164,7 @@
               </a:ln>
               <a:extLst>
                 <a:ext uri="{91240B29-F687-4f45-9708-019B960494DF}">
-                  <a14:hiddenLine xmlns="" xmlns:a14="http://schemas.microsoft.com/office/drawing/2010/main" w="9525">
+                  <a14:hiddenLine xmlns:a14="http://schemas.microsoft.com/office/drawing/2010/main" xmlns="" w="9525">
                     <a:solidFill>
                       <a:srgbClr val="000000"/>
                     </a:solidFill>
@@ -12254,7 +12254,7 @@
               </a:ln>
               <a:extLst>
                 <a:ext uri="{91240B29-F687-4f45-9708-019B960494DF}">
-                  <a14:hiddenLine xmlns="" xmlns:a14="http://schemas.microsoft.com/office/drawing/2010/main" w="9525">
+                  <a14:hiddenLine xmlns:a14="http://schemas.microsoft.com/office/drawing/2010/main" xmlns="" w="9525">
                     <a:solidFill>
                       <a:srgbClr val="000000"/>
                     </a:solidFill>
@@ -12322,7 +12322,7 @@
               </a:ln>
               <a:extLst>
                 <a:ext uri="{91240B29-F687-4f45-9708-019B960494DF}">
-                  <a14:hiddenLine xmlns="" xmlns:a14="http://schemas.microsoft.com/office/drawing/2010/main" w="9525">
+                  <a14:hiddenLine xmlns:a14="http://schemas.microsoft.com/office/drawing/2010/main" xmlns="" w="9525">
                     <a:solidFill>
                       <a:srgbClr val="000000"/>
                     </a:solidFill>
@@ -12412,7 +12412,7 @@
               </a:ln>
               <a:extLst>
                 <a:ext uri="{91240B29-F687-4f45-9708-019B960494DF}">
-                  <a14:hiddenLine xmlns="" xmlns:a14="http://schemas.microsoft.com/office/drawing/2010/main" w="9525">
+                  <a14:hiddenLine xmlns:a14="http://schemas.microsoft.com/office/drawing/2010/main" xmlns="" w="9525">
                     <a:solidFill>
                       <a:srgbClr val="000000"/>
                     </a:solidFill>
@@ -12446,7 +12446,7 @@
               </a:ln>
               <a:extLst>
                 <a:ext uri="{91240B29-F687-4f45-9708-019B960494DF}">
-                  <a14:hiddenLine xmlns="" xmlns:a14="http://schemas.microsoft.com/office/drawing/2010/main" w="9525">
+                  <a14:hiddenLine xmlns:a14="http://schemas.microsoft.com/office/drawing/2010/main" xmlns="" w="9525">
                     <a:solidFill>
                       <a:srgbClr val="000000"/>
                     </a:solidFill>
@@ -12586,7 +12586,7 @@
           <a:p>
             <a:fld id="{EC4347D3-4C9A-C240-8F14-750059DFEEB0}" type="datetimeFigureOut">
               <a:rPr lang="en-US" smtClean="0"/>
-              <a:t>5/15/25</a:t>
+              <a:t>5/19/25</a:t>
             </a:fld>
             <a:endParaRPr lang="en-US"/>
           </a:p>
@@ -17526,7 +17526,7 @@
         </p:spPr>
         <p:txBody>
           <a:bodyPr>
-            <a:normAutofit fontScale="77500" lnSpcReduction="20000"/>
+            <a:normAutofit fontScale="85000" lnSpcReduction="20000"/>
           </a:bodyPr>
           <a:lstStyle/>
           <a:p>
@@ -17608,21 +17608,15 @@
             <a:pPr lvl="2"/>
             <a:r>
               <a:rPr lang="en-US" dirty="0"/>
-              <a:t>Mia McCarrick, who is a very experienced DMT2 TA!</a:t>
-            </a:r>
-          </a:p>
-          <a:p>
-            <a:pPr lvl="1"/>
+              <a:t>Natalia </a:t>
+            </a:r>
+            <a:r>
+              <a:rPr lang="en-US" dirty="0" err="1"/>
+              <a:t>Wunder</a:t>
+            </a:r>
             <a:r>
               <a:rPr lang="en-US" dirty="0"/>
-              <a:t>Both will hold office hours, which will start next week</a:t>
-            </a:r>
-          </a:p>
-          <a:p>
-            <a:pPr lvl="2"/>
-            <a:r>
-              <a:rPr lang="en-US" dirty="0"/>
-              <a:t>Locations and hours mostly set on course website</a:t>
+              <a:t>, who is an experienced, returning DMT2 TA!</a:t>
             </a:r>
           </a:p>
           <a:p>
@@ -17975,18 +17969,8 @@
           </a:p>
           <a:p>
             <a:r>
-              <a:rPr lang="en-US" b="1" i="1" u="sng" dirty="0"/>
-              <a:t>Google Forms</a:t>
-            </a:r>
-            <a:r>
               <a:rPr lang="en-US" dirty="0"/>
-              <a:t>: Homework extension requests will be submitted through a form.</a:t>
-            </a:r>
-          </a:p>
-          <a:p>
-            <a:r>
-              <a:rPr lang="en-US" dirty="0"/>
-              <a:t>All of these will be linked from Collab and from course website</a:t>
+              <a:t>All of these will be linked from Canvas and from course website</a:t>
             </a:r>
           </a:p>
           <a:p>

</xml_diff>